<commit_message>
Add proof question 2
</commit_message>
<xml_diff>
--- a/Schéma_flot.pptx
+++ b/Schéma_flot.pptx
@@ -104,6 +104,11 @@
       </a:defRPr>
     </a:lvl9pPr>
   </p:defaultTextStyle>
+  <p:extLst>
+    <p:ext uri="{EFAFB233-063F-42B5-8137-9DF3F51BA10A}">
+      <p15:sldGuideLst xmlns:p15="http://schemas.microsoft.com/office/powerpoint/2012/main"/>
+    </p:ext>
+  </p:extLst>
 </p:presentation>
 </file>
 
@@ -238,7 +243,7 @@
           <a:p>
             <a:fld id="{C6DDCCC2-CE2E-44CF-8BF5-5DF8231D3810}" type="datetimeFigureOut">
               <a:rPr lang="fr-BE" smtClean="0"/>
-              <a:t>09-05-15</a:t>
+              <a:t>10-05-15</a:t>
             </a:fld>
             <a:endParaRPr lang="fr-BE"/>
           </a:p>
@@ -408,7 +413,7 @@
           <a:p>
             <a:fld id="{C6DDCCC2-CE2E-44CF-8BF5-5DF8231D3810}" type="datetimeFigureOut">
               <a:rPr lang="fr-BE" smtClean="0"/>
-              <a:t>09-05-15</a:t>
+              <a:t>10-05-15</a:t>
             </a:fld>
             <a:endParaRPr lang="fr-BE"/>
           </a:p>
@@ -588,7 +593,7 @@
           <a:p>
             <a:fld id="{C6DDCCC2-CE2E-44CF-8BF5-5DF8231D3810}" type="datetimeFigureOut">
               <a:rPr lang="fr-BE" smtClean="0"/>
-              <a:t>09-05-15</a:t>
+              <a:t>10-05-15</a:t>
             </a:fld>
             <a:endParaRPr lang="fr-BE"/>
           </a:p>
@@ -758,7 +763,7 @@
           <a:p>
             <a:fld id="{C6DDCCC2-CE2E-44CF-8BF5-5DF8231D3810}" type="datetimeFigureOut">
               <a:rPr lang="fr-BE" smtClean="0"/>
-              <a:t>09-05-15</a:t>
+              <a:t>10-05-15</a:t>
             </a:fld>
             <a:endParaRPr lang="fr-BE"/>
           </a:p>
@@ -1004,7 +1009,7 @@
           <a:p>
             <a:fld id="{C6DDCCC2-CE2E-44CF-8BF5-5DF8231D3810}" type="datetimeFigureOut">
               <a:rPr lang="fr-BE" smtClean="0"/>
-              <a:t>09-05-15</a:t>
+              <a:t>10-05-15</a:t>
             </a:fld>
             <a:endParaRPr lang="fr-BE"/>
           </a:p>
@@ -1236,7 +1241,7 @@
           <a:p>
             <a:fld id="{C6DDCCC2-CE2E-44CF-8BF5-5DF8231D3810}" type="datetimeFigureOut">
               <a:rPr lang="fr-BE" smtClean="0"/>
-              <a:t>09-05-15</a:t>
+              <a:t>10-05-15</a:t>
             </a:fld>
             <a:endParaRPr lang="fr-BE"/>
           </a:p>
@@ -1603,7 +1608,7 @@
           <a:p>
             <a:fld id="{C6DDCCC2-CE2E-44CF-8BF5-5DF8231D3810}" type="datetimeFigureOut">
               <a:rPr lang="fr-BE" smtClean="0"/>
-              <a:t>09-05-15</a:t>
+              <a:t>10-05-15</a:t>
             </a:fld>
             <a:endParaRPr lang="fr-BE"/>
           </a:p>
@@ -1721,7 +1726,7 @@
           <a:p>
             <a:fld id="{C6DDCCC2-CE2E-44CF-8BF5-5DF8231D3810}" type="datetimeFigureOut">
               <a:rPr lang="fr-BE" smtClean="0"/>
-              <a:t>09-05-15</a:t>
+              <a:t>10-05-15</a:t>
             </a:fld>
             <a:endParaRPr lang="fr-BE"/>
           </a:p>
@@ -1816,7 +1821,7 @@
           <a:p>
             <a:fld id="{C6DDCCC2-CE2E-44CF-8BF5-5DF8231D3810}" type="datetimeFigureOut">
               <a:rPr lang="fr-BE" smtClean="0"/>
-              <a:t>09-05-15</a:t>
+              <a:t>10-05-15</a:t>
             </a:fld>
             <a:endParaRPr lang="fr-BE"/>
           </a:p>
@@ -2093,7 +2098,7 @@
           <a:p>
             <a:fld id="{C6DDCCC2-CE2E-44CF-8BF5-5DF8231D3810}" type="datetimeFigureOut">
               <a:rPr lang="fr-BE" smtClean="0"/>
-              <a:t>09-05-15</a:t>
+              <a:t>10-05-15</a:t>
             </a:fld>
             <a:endParaRPr lang="fr-BE"/>
           </a:p>
@@ -2346,7 +2351,7 @@
           <a:p>
             <a:fld id="{C6DDCCC2-CE2E-44CF-8BF5-5DF8231D3810}" type="datetimeFigureOut">
               <a:rPr lang="fr-BE" smtClean="0"/>
-              <a:t>09-05-15</a:t>
+              <a:t>10-05-15</a:t>
             </a:fld>
             <a:endParaRPr lang="fr-BE"/>
           </a:p>
@@ -2559,7 +2564,7 @@
           <a:p>
             <a:fld id="{C6DDCCC2-CE2E-44CF-8BF5-5DF8231D3810}" type="datetimeFigureOut">
               <a:rPr lang="fr-BE" smtClean="0"/>
-              <a:t>09-05-15</a:t>
+              <a:t>10-05-15</a:t>
             </a:fld>
             <a:endParaRPr lang="fr-BE"/>
           </a:p>
@@ -3336,8 +3341,8 @@
           </a:fontRef>
         </p:style>
       </p:cxnSp>
-      <mc:AlternateContent xmlns:mc="http://schemas.openxmlformats.org/markup-compatibility/2006">
-        <mc:Choice xmlns:a14="http://schemas.microsoft.com/office/drawing/2010/main" Requires="a14">
+      <mc:AlternateContent xmlns:mc="http://schemas.openxmlformats.org/markup-compatibility/2006" xmlns:a14="http://schemas.microsoft.com/office/drawing/2010/main">
+        <mc:Choice Requires="a14">
           <p:sp>
             <p:nvSpPr>
               <p:cNvPr id="31" name="ZoneTexte 30"/>
@@ -3360,6 +3365,7 @@
               </a:bodyPr>
               <a:lstStyle/>
               <a:p>
+                <a:pPr/>
                 <a14:m>
                   <m:oMathPara xmlns:m="http://schemas.openxmlformats.org/officeDocument/2006/math">
                     <m:oMathParaPr>
@@ -3435,7 +3441,7 @@
             </p:txBody>
           </p:sp>
         </mc:Choice>
-        <mc:Fallback>
+        <mc:Fallback xmlns="">
           <p:sp>
             <p:nvSpPr>
               <p:cNvPr id="31" name="ZoneTexte 30"/>
@@ -3594,8 +3600,8 @@
           </a:p>
         </p:txBody>
       </p:sp>
-      <mc:AlternateContent xmlns:mc="http://schemas.openxmlformats.org/markup-compatibility/2006">
-        <mc:Choice xmlns:a14="http://schemas.microsoft.com/office/drawing/2010/main" Requires="a14">
+      <mc:AlternateContent xmlns:mc="http://schemas.openxmlformats.org/markup-compatibility/2006" xmlns:a14="http://schemas.microsoft.com/office/drawing/2010/main">
+        <mc:Choice Requires="a14">
           <p:sp>
             <p:nvSpPr>
               <p:cNvPr id="37" name="ZoneTexte 36"/>
@@ -3618,6 +3624,7 @@
               </a:bodyPr>
               <a:lstStyle/>
               <a:p>
+                <a:pPr/>
                 <a14:m>
                   <m:oMathPara xmlns:m="http://schemas.openxmlformats.org/officeDocument/2006/math">
                     <m:oMathParaPr>
@@ -3644,7 +3651,7 @@
             </p:txBody>
           </p:sp>
         </mc:Choice>
-        <mc:Fallback>
+        <mc:Fallback xmlns="">
           <p:sp>
             <p:nvSpPr>
               <p:cNvPr id="37" name="ZoneTexte 36"/>
@@ -3908,8 +3915,8 @@
           </a:fontRef>
         </p:style>
       </p:cxnSp>
-      <mc:AlternateContent xmlns:mc="http://schemas.openxmlformats.org/markup-compatibility/2006">
-        <mc:Choice xmlns:a14="http://schemas.microsoft.com/office/drawing/2010/main" Requires="a14">
+      <mc:AlternateContent xmlns:mc="http://schemas.openxmlformats.org/markup-compatibility/2006" xmlns:a14="http://schemas.microsoft.com/office/drawing/2010/main">
+        <mc:Choice Requires="a14">
           <p:sp>
             <p:nvSpPr>
               <p:cNvPr id="66" name="ZoneTexte 65"/>
@@ -3932,6 +3939,7 @@
               </a:bodyPr>
               <a:lstStyle/>
               <a:p>
+                <a:pPr/>
                 <a14:m>
                   <m:oMathPara xmlns:m="http://schemas.openxmlformats.org/officeDocument/2006/math">
                     <m:oMathParaPr>
@@ -3958,7 +3966,7 @@
             </p:txBody>
           </p:sp>
         </mc:Choice>
-        <mc:Fallback>
+        <mc:Fallback xmlns="">
           <p:sp>
             <p:nvSpPr>
               <p:cNvPr id="66" name="ZoneTexte 65"/>
@@ -4389,8 +4397,8 @@
           </a:fontRef>
         </p:style>
       </p:cxnSp>
-      <mc:AlternateContent xmlns:mc="http://schemas.openxmlformats.org/markup-compatibility/2006">
-        <mc:Choice xmlns:a14="http://schemas.microsoft.com/office/drawing/2010/main" Requires="a14">
+      <mc:AlternateContent xmlns:mc="http://schemas.openxmlformats.org/markup-compatibility/2006" xmlns:a14="http://schemas.microsoft.com/office/drawing/2010/main">
+        <mc:Choice Requires="a14">
           <p:sp>
             <p:nvSpPr>
               <p:cNvPr id="92" name="ZoneTexte 91"/>
@@ -4413,6 +4421,7 @@
               </a:bodyPr>
               <a:lstStyle/>
               <a:p>
+                <a:pPr/>
                 <a14:m>
                   <m:oMathPara xmlns:m="http://schemas.openxmlformats.org/officeDocument/2006/math">
                     <m:oMathParaPr>
@@ -4451,7 +4460,7 @@
             </p:txBody>
           </p:sp>
         </mc:Choice>
-        <mc:Fallback>
+        <mc:Fallback xmlns="">
           <p:sp>
             <p:nvSpPr>
               <p:cNvPr id="92" name="ZoneTexte 91"/>
@@ -4520,8 +4529,8 @@
           </a:p>
         </p:txBody>
       </p:sp>
-      <mc:AlternateContent xmlns:mc="http://schemas.openxmlformats.org/markup-compatibility/2006">
-        <mc:Choice xmlns:a14="http://schemas.microsoft.com/office/drawing/2010/main" Requires="a14">
+      <mc:AlternateContent xmlns:mc="http://schemas.openxmlformats.org/markup-compatibility/2006" xmlns:a14="http://schemas.microsoft.com/office/drawing/2010/main">
+        <mc:Choice Requires="a14">
           <p:sp>
             <p:nvSpPr>
               <p:cNvPr id="94" name="ZoneTexte 93"/>
@@ -4552,6 +4561,7 @@
                 </a:r>
               </a:p>
               <a:p>
+                <a:pPr/>
                 <a14:m>
                   <m:oMathPara xmlns:m="http://schemas.openxmlformats.org/officeDocument/2006/math">
                     <m:oMathParaPr>
@@ -4646,7 +4656,7 @@
             </p:txBody>
           </p:sp>
         </mc:Choice>
-        <mc:Fallback>
+        <mc:Fallback xmlns="">
           <p:sp>
             <p:nvSpPr>
               <p:cNvPr id="94" name="ZoneTexte 93"/>
@@ -4685,8 +4695,8 @@
           </p:sp>
         </mc:Fallback>
       </mc:AlternateContent>
-      <mc:AlternateContent xmlns:mc="http://schemas.openxmlformats.org/markup-compatibility/2006">
-        <mc:Choice xmlns:a14="http://schemas.microsoft.com/office/drawing/2010/main" Requires="a14">
+      <mc:AlternateContent xmlns:mc="http://schemas.openxmlformats.org/markup-compatibility/2006" xmlns:a14="http://schemas.microsoft.com/office/drawing/2010/main">
+        <mc:Choice Requires="a14">
           <p:sp>
             <p:nvSpPr>
               <p:cNvPr id="95" name="ZoneTexte 94"/>
@@ -4709,6 +4719,7 @@
               </a:bodyPr>
               <a:lstStyle/>
               <a:p>
+                <a:pPr/>
                 <a14:m>
                   <m:oMathPara xmlns:m="http://schemas.openxmlformats.org/officeDocument/2006/math">
                     <m:oMathParaPr>
@@ -4896,7 +4907,7 @@
             </p:txBody>
           </p:sp>
         </mc:Choice>
-        <mc:Fallback>
+        <mc:Fallback xmlns="">
           <p:sp>
             <p:nvSpPr>
               <p:cNvPr id="95" name="ZoneTexte 94"/>
@@ -4917,6 +4928,246 @@
                 <a:blip r:embed="rId7"/>
                 <a:stretch>
                   <a:fillRect/>
+                </a:stretch>
+              </a:blipFill>
+            </p:spPr>
+            <p:txBody>
+              <a:bodyPr/>
+              <a:lstStyle/>
+              <a:p>
+                <a:r>
+                  <a:rPr lang="fr-BE">
+                    <a:noFill/>
+                  </a:rPr>
+                  <a:t> </a:t>
+                </a:r>
+              </a:p>
+            </p:txBody>
+          </p:sp>
+        </mc:Fallback>
+      </mc:AlternateContent>
+      <p:sp>
+        <p:nvSpPr>
+          <p:cNvPr id="42" name="Ellipse 41"/>
+          <p:cNvSpPr/>
+          <p:nvPr/>
+        </p:nvSpPr>
+        <p:spPr>
+          <a:xfrm>
+            <a:off x="11578457" y="2826571"/>
+            <a:ext cx="320040" cy="338328"/>
+          </a:xfrm>
+          <a:prstGeom prst="ellipse">
+            <a:avLst/>
+          </a:prstGeom>
+        </p:spPr>
+        <p:style>
+          <a:lnRef idx="2">
+            <a:schemeClr val="accent1">
+              <a:shade val="50000"/>
+            </a:schemeClr>
+          </a:lnRef>
+          <a:fillRef idx="1">
+            <a:schemeClr val="accent1"/>
+          </a:fillRef>
+          <a:effectRef idx="0">
+            <a:schemeClr val="accent1"/>
+          </a:effectRef>
+          <a:fontRef idx="minor">
+            <a:schemeClr val="lt1"/>
+          </a:fontRef>
+        </p:style>
+        <p:txBody>
+          <a:bodyPr rtlCol="0" anchor="ctr"/>
+          <a:lstStyle/>
+          <a:p>
+            <a:pPr algn="ctr"/>
+            <a:endParaRPr lang="fr-BE"/>
+          </a:p>
+        </p:txBody>
+      </p:sp>
+      <p:cxnSp>
+        <p:nvCxnSpPr>
+          <p:cNvPr id="3" name="Connecteur droit avec flèche 2"/>
+          <p:cNvCxnSpPr>
+            <a:stCxn id="42" idx="4"/>
+          </p:cNvCxnSpPr>
+          <p:nvPr/>
+        </p:nvCxnSpPr>
+        <p:spPr>
+          <a:xfrm>
+            <a:off x="11738477" y="3164899"/>
+            <a:ext cx="0" cy="949901"/>
+          </a:xfrm>
+          <a:prstGeom prst="straightConnector1">
+            <a:avLst/>
+          </a:prstGeom>
+          <a:ln>
+            <a:tailEnd type="triangle"/>
+          </a:ln>
+        </p:spPr>
+        <p:style>
+          <a:lnRef idx="1">
+            <a:schemeClr val="accent1"/>
+          </a:lnRef>
+          <a:fillRef idx="0">
+            <a:schemeClr val="accent1"/>
+          </a:fillRef>
+          <a:effectRef idx="0">
+            <a:schemeClr val="accent1"/>
+          </a:effectRef>
+          <a:fontRef idx="minor">
+            <a:schemeClr val="tx1"/>
+          </a:fontRef>
+        </p:style>
+      </p:cxnSp>
+      <p:sp>
+        <p:nvSpPr>
+          <p:cNvPr id="46" name="ZoneTexte 45"/>
+          <p:cNvSpPr txBox="1"/>
+          <p:nvPr/>
+        </p:nvSpPr>
+        <p:spPr>
+          <a:xfrm>
+            <a:off x="10967304" y="4251960"/>
+            <a:ext cx="1179576" cy="276999"/>
+          </a:xfrm>
+          <a:prstGeom prst="rect">
+            <a:avLst/>
+          </a:prstGeom>
+          <a:noFill/>
+        </p:spPr>
+        <p:txBody>
+          <a:bodyPr wrap="square" rtlCol="0">
+            <a:spAutoFit/>
+          </a:bodyPr>
+          <a:lstStyle/>
+          <a:p>
+            <a:r>
+              <a:rPr lang="fr-BE" sz="1200" dirty="0" err="1" smtClean="0"/>
+              <a:t>Stock_initial</a:t>
+            </a:r>
+            <a:endParaRPr lang="fr-BE" sz="1200" dirty="0"/>
+          </a:p>
+        </p:txBody>
+      </p:sp>
+      <p:cxnSp>
+        <p:nvCxnSpPr>
+          <p:cNvPr id="47" name="Connecteur droit avec flèche 46"/>
+          <p:cNvCxnSpPr/>
+          <p:nvPr/>
+        </p:nvCxnSpPr>
+        <p:spPr>
+          <a:xfrm flipV="1">
+            <a:off x="11738477" y="1994796"/>
+            <a:ext cx="0" cy="909828"/>
+          </a:xfrm>
+          <a:prstGeom prst="straightConnector1">
+            <a:avLst/>
+          </a:prstGeom>
+          <a:ln>
+            <a:tailEnd type="triangle"/>
+          </a:ln>
+        </p:spPr>
+        <p:style>
+          <a:lnRef idx="1">
+            <a:schemeClr val="accent1"/>
+          </a:lnRef>
+          <a:fillRef idx="0">
+            <a:schemeClr val="accent1"/>
+          </a:fillRef>
+          <a:effectRef idx="0">
+            <a:schemeClr val="accent1"/>
+          </a:effectRef>
+          <a:fontRef idx="minor">
+            <a:schemeClr val="tx1"/>
+          </a:fontRef>
+        </p:style>
+      </p:cxnSp>
+      <mc:AlternateContent xmlns:mc="http://schemas.openxmlformats.org/markup-compatibility/2006">
+        <mc:Choice xmlns:a14="http://schemas.microsoft.com/office/drawing/2010/main" Requires="a14">
+          <p:sp>
+            <p:nvSpPr>
+              <p:cNvPr id="49" name="ZoneTexte 48"/>
+              <p:cNvSpPr txBox="1"/>
+              <p:nvPr/>
+            </p:nvSpPr>
+            <p:spPr>
+              <a:xfrm>
+                <a:off x="11249962" y="1490722"/>
+                <a:ext cx="896464" cy="184666"/>
+              </a:xfrm>
+              <a:prstGeom prst="rect">
+                <a:avLst/>
+              </a:prstGeom>
+              <a:noFill/>
+            </p:spPr>
+            <p:txBody>
+              <a:bodyPr wrap="none" lIns="0" tIns="0" rIns="0" bIns="0" rtlCol="0">
+                <a:spAutoFit/>
+              </a:bodyPr>
+              <a:lstStyle/>
+              <a:p>
+                <a:pPr/>
+                <a14:m>
+                  <m:oMathPara xmlns:m="http://schemas.openxmlformats.org/officeDocument/2006/math">
+                    <m:oMathParaPr>
+                      <m:jc m:val="centerGroup"/>
+                    </m:oMathParaPr>
+                    <m:oMath xmlns:m="http://schemas.openxmlformats.org/officeDocument/2006/math">
+                      <m:r>
+                        <a:rPr lang="fr-BE" sz="1200" b="0" i="1" smtClean="0">
+                          <a:latin typeface="Cambria Math" panose="02040503050406030204" pitchFamily="18" charset="0"/>
+                        </a:rPr>
+                        <m:t>𝑑𝑒𝑚𝑎𝑛𝑑𝑒</m:t>
+                      </m:r>
+                      <m:r>
+                        <a:rPr lang="fr-BE" sz="1200" b="0" i="1" smtClean="0">
+                          <a:latin typeface="Cambria Math" panose="02040503050406030204" pitchFamily="18" charset="0"/>
+                        </a:rPr>
+                        <m:t>(</m:t>
+                      </m:r>
+                      <m:r>
+                        <a:rPr lang="fr-BE" sz="1200" b="0" i="1" smtClean="0">
+                          <a:latin typeface="Cambria Math" panose="02040503050406030204" pitchFamily="18" charset="0"/>
+                        </a:rPr>
+                        <m:t>𝑇</m:t>
+                      </m:r>
+                      <m:r>
+                        <a:rPr lang="fr-BE" sz="1200" b="0" i="1" smtClean="0">
+                          <a:latin typeface="Cambria Math" panose="02040503050406030204" pitchFamily="18" charset="0"/>
+                        </a:rPr>
+                        <m:t>)</m:t>
+                      </m:r>
+                    </m:oMath>
+                  </m:oMathPara>
+                </a14:m>
+                <a:endParaRPr lang="fr-BE" sz="1200" dirty="0"/>
+              </a:p>
+            </p:txBody>
+          </p:sp>
+        </mc:Choice>
+        <mc:Fallback>
+          <p:sp>
+            <p:nvSpPr>
+              <p:cNvPr id="49" name="ZoneTexte 48"/>
+              <p:cNvSpPr txBox="1">
+                <a:spLocks noRot="1" noChangeAspect="1" noMove="1" noResize="1" noEditPoints="1" noAdjustHandles="1" noChangeArrowheads="1" noChangeShapeType="1" noTextEdit="1"/>
+              </p:cNvSpPr>
+              <p:nvPr/>
+            </p:nvSpPr>
+            <p:spPr>
+              <a:xfrm>
+                <a:off x="11249962" y="1490722"/>
+                <a:ext cx="896464" cy="184666"/>
+              </a:xfrm>
+              <a:prstGeom prst="rect">
+                <a:avLst/>
+              </a:prstGeom>
+              <a:blipFill rotWithShape="0">
+                <a:blip r:embed="rId8"/>
+                <a:stretch>
+                  <a:fillRect l="-4054" t="-6667" r="-5405" b="-36667"/>
                 </a:stretch>
               </a:blipFill>
             </p:spPr>

</xml_diff>

<commit_message>
Add diagram in rapport
</commit_message>
<xml_diff>
--- a/Schéma_flot.pptx
+++ b/Schéma_flot.pptx
@@ -3005,7 +3005,11 @@
           <a:lstStyle/>
           <a:p>
             <a:pPr algn="ctr"/>
-            <a:endParaRPr lang="fr-BE"/>
+            <a:r>
+              <a:rPr lang="fr-BE" dirty="0" smtClean="0"/>
+              <a:t>1</a:t>
+            </a:r>
+            <a:endParaRPr lang="fr-BE" dirty="0"/>
           </a:p>
         </p:txBody>
       </p:sp>
@@ -3045,7 +3049,11 @@
           <a:lstStyle/>
           <a:p>
             <a:pPr algn="ctr"/>
-            <a:endParaRPr lang="fr-BE"/>
+            <a:r>
+              <a:rPr lang="fr-BE" dirty="0" smtClean="0"/>
+              <a:t>2</a:t>
+            </a:r>
+            <a:endParaRPr lang="fr-BE" dirty="0"/>
           </a:p>
         </p:txBody>
       </p:sp>
@@ -3085,7 +3093,11 @@
           <a:lstStyle/>
           <a:p>
             <a:pPr algn="ctr"/>
-            <a:endParaRPr lang="fr-BE"/>
+            <a:r>
+              <a:rPr lang="fr-BE" dirty="0"/>
+              <a:t>s</a:t>
+            </a:r>
+            <a:endParaRPr lang="fr-BE" dirty="0"/>
           </a:p>
         </p:txBody>
       </p:sp>
@@ -3125,7 +3137,11 @@
           <a:lstStyle/>
           <a:p>
             <a:pPr algn="ctr"/>
-            <a:endParaRPr lang="fr-BE"/>
+            <a:r>
+              <a:rPr lang="fr-BE" dirty="0" smtClean="0"/>
+              <a:t>0</a:t>
+            </a:r>
+            <a:endParaRPr lang="fr-BE" dirty="0"/>
           </a:p>
         </p:txBody>
       </p:sp>
@@ -3341,8 +3357,8 @@
           </a:fontRef>
         </p:style>
       </p:cxnSp>
-      <mc:AlternateContent xmlns:mc="http://schemas.openxmlformats.org/markup-compatibility/2006" xmlns:a14="http://schemas.microsoft.com/office/drawing/2010/main">
-        <mc:Choice Requires="a14">
+      <mc:AlternateContent xmlns:mc="http://schemas.openxmlformats.org/markup-compatibility/2006">
+        <mc:Choice xmlns:a14="http://schemas.microsoft.com/office/drawing/2010/main" Requires="a14">
           <p:sp>
             <p:nvSpPr>
               <p:cNvPr id="31" name="ZoneTexte 30"/>
@@ -3383,13 +3399,10 @@
                         </m:naryPr>
                         <m:sub>
                           <m:r>
-                            <m:rPr>
-                              <m:brk m:alnAt="23"/>
-                            </m:rPr>
                             <a:rPr lang="fr-BE" sz="1200" b="0" i="1" smtClean="0">
                               <a:latin typeface="Cambria Math" panose="02040503050406030204" pitchFamily="18" charset="0"/>
                             </a:rPr>
-                            <m:t>𝑖</m:t>
+                            <m:t>𝑠</m:t>
                           </m:r>
                           <m:r>
                             <a:rPr lang="fr-BE" sz="1200" b="0" i="1" smtClean="0">
@@ -3423,7 +3436,7 @@
                             <a:rPr lang="fr-BE" sz="1200" b="0" i="1" smtClean="0">
                               <a:latin typeface="Cambria Math" panose="02040503050406030204" pitchFamily="18" charset="0"/>
                             </a:rPr>
-                            <m:t>𝑖</m:t>
+                            <m:t>𝑠</m:t>
                           </m:r>
                           <m:r>
                             <a:rPr lang="fr-BE" sz="1200" b="0" i="1" smtClean="0">
@@ -3441,7 +3454,7 @@
             </p:txBody>
           </p:sp>
         </mc:Choice>
-        <mc:Fallback xmlns="">
+        <mc:Fallback>
           <p:sp>
             <p:nvSpPr>
               <p:cNvPr id="31" name="ZoneTexte 30"/>
@@ -4397,8 +4410,8 @@
           </a:fontRef>
         </p:style>
       </p:cxnSp>
-      <mc:AlternateContent xmlns:mc="http://schemas.openxmlformats.org/markup-compatibility/2006" xmlns:a14="http://schemas.microsoft.com/office/drawing/2010/main">
-        <mc:Choice Requires="a14">
+      <mc:AlternateContent xmlns:mc="http://schemas.openxmlformats.org/markup-compatibility/2006">
+        <mc:Choice xmlns:a14="http://schemas.microsoft.com/office/drawing/2010/main" Requires="a14">
           <p:sp>
             <p:nvSpPr>
               <p:cNvPr id="92" name="ZoneTexte 91"/>
@@ -4408,7 +4421,7 @@
             <p:spPr>
               <a:xfrm>
                 <a:off x="8997853" y="1483523"/>
-                <a:ext cx="854658" cy="184666"/>
+                <a:ext cx="875368" cy="184666"/>
               </a:xfrm>
               <a:prstGeom prst="rect">
                 <a:avLst/>
@@ -4444,7 +4457,7 @@
                         <a:rPr lang="fr-BE" sz="1200" b="0" i="1" smtClean="0">
                           <a:latin typeface="Cambria Math" panose="02040503050406030204" pitchFamily="18" charset="0"/>
                         </a:rPr>
-                        <m:t>𝑖</m:t>
+                        <m:t>𝑠</m:t>
                       </m:r>
                       <m:r>
                         <a:rPr lang="fr-BE" sz="1200" b="0" i="1" smtClean="0">
@@ -4460,7 +4473,7 @@
             </p:txBody>
           </p:sp>
         </mc:Choice>
-        <mc:Fallback xmlns="">
+        <mc:Fallback>
           <p:sp>
             <p:nvSpPr>
               <p:cNvPr id="92" name="ZoneTexte 91"/>
@@ -4472,7 +4485,7 @@
             <p:spPr>
               <a:xfrm>
                 <a:off x="8997853" y="1483523"/>
-                <a:ext cx="854658" cy="184666"/>
+                <a:ext cx="875368" cy="184666"/>
               </a:xfrm>
               <a:prstGeom prst="rect">
                 <a:avLst/>
@@ -4480,7 +4493,7 @@
               <a:blipFill rotWithShape="0">
                 <a:blip r:embed="rId5"/>
                 <a:stretch>
-                  <a:fillRect l="-4286" t="-3226" r="-6429" b="-35484"/>
+                  <a:fillRect l="-3472" t="-3226" r="-6250" b="-35484"/>
                 </a:stretch>
               </a:blipFill>
             </p:spPr>
@@ -4982,7 +4995,11 @@
           <a:lstStyle/>
           <a:p>
             <a:pPr algn="ctr"/>
-            <a:endParaRPr lang="fr-BE"/>
+            <a:r>
+              <a:rPr lang="fr-BE" dirty="0" smtClean="0"/>
+              <a:t>T</a:t>
+            </a:r>
+            <a:endParaRPr lang="fr-BE" dirty="0"/>
           </a:p>
         </p:txBody>
       </p:sp>

</xml_diff>